<commit_message>
lecture 11 session 1
</commit_message>
<xml_diff>
--- a/lectures/11/1_Correlation.pptx
+++ b/lectures/11/1_Correlation.pptx
@@ -13557,7 +13557,7 @@
           <a:p>
             <a:fld id="{73B2889B-A0AC-4482-8592-5C96F2309420}" type="datetimeFigureOut">
               <a:rPr lang="en-US" smtClean="0"/>
-              <a:t>11/1/2021</a:t>
+              <a:t>4/3/2022</a:t>
             </a:fld>
             <a:endParaRPr lang="en-US"/>
           </a:p>
@@ -13734,7 +13734,7 @@
           <a:p>
             <a:fld id="{830EB223-FFC0-462A-A3B8-EAA7CE0F8CBD}" type="datetimeFigureOut">
               <a:rPr lang="en-US" smtClean="0"/>
-              <a:t>11/1/2021</a:t>
+              <a:t>4/3/2022</a:t>
             </a:fld>
             <a:endParaRPr lang="en-US" dirty="0"/>
           </a:p>
@@ -14045,10 +14045,34 @@
           <a:bodyPr/>
           <a:lstStyle/>
           <a:p>
+            <a:pPr marL="0" marR="0" lvl="0" indent="0" algn="l" defTabSz="914400" rtl="0" eaLnBrk="1" fontAlgn="auto" latinLnBrk="0" hangingPunct="1">
+              <a:lnSpc>
+                <a:spcPct val="100000"/>
+              </a:lnSpc>
+              <a:spcBef>
+                <a:spcPts val="0"/>
+              </a:spcBef>
+              <a:spcAft>
+                <a:spcPts val="0"/>
+              </a:spcAft>
+              <a:buClrTx/>
+              <a:buSzTx/>
+              <a:buFontTx/>
+              <a:buNone/>
+              <a:tabLst/>
+              <a:defRPr/>
+            </a:pPr>
             <a:r>
-              <a:rPr lang="en-US" dirty="0"/>
-              <a:t>A</a:t>
+              <a:rPr lang="en-US" sz="1200" dirty="0">
+                <a:solidFill>
+                  <a:schemeClr val="bg1"/>
+                </a:solidFill>
+              </a:rPr>
+              <a:t>Get some candies</a:t>
             </a:r>
+          </a:p>
+          <a:p>
+            <a:endParaRPr lang="en-US" dirty="0"/>
           </a:p>
         </p:txBody>
       </p:sp>
@@ -14069,7 +14093,7 @@
           <a:p>
             <a:fld id="{BC849E9A-41F7-4779-A581-48A7C374A227}" type="slidenum">
               <a:rPr lang="en-US" smtClean="0"/>
-              <a:t>2</a:t>
+              <a:t>1</a:t>
             </a:fld>
             <a:endParaRPr lang="en-US" dirty="0"/>
           </a:p>
@@ -14078,7 +14102,7 @@
     </p:spTree>
     <p:extLst>
       <p:ext uri="{BB962C8B-B14F-4D97-AF65-F5344CB8AC3E}">
-        <p14:creationId xmlns:p14="http://schemas.microsoft.com/office/powerpoint/2010/main" val="4290399702"/>
+        <p14:creationId xmlns:p14="http://schemas.microsoft.com/office/powerpoint/2010/main" val="952882125"/>
       </p:ext>
     </p:extLst>
   </p:cSld>
@@ -14134,55 +14158,8 @@
           <a:p>
             <a:r>
               <a:rPr lang="en-US" dirty="0"/>
-              <a:t>What we’ve discussed so far is just linear relationship or linear association between satisfaction and laptop cost. </a:t>
+              <a:t>Which plot do you think has a stronger association? (Left one) </a:t>
             </a:r>
-            <a:br>
-              <a:rPr lang="en-US" dirty="0"/>
-            </a:br>
-            <a:r>
-              <a:rPr lang="en-US" dirty="0"/>
-              <a:t>But this relationship could also be non-linear </a:t>
-            </a:r>
-          </a:p>
-          <a:p>
-            <a:endParaRPr lang="en-US" dirty="0"/>
-          </a:p>
-          <a:p>
-            <a:pPr marL="0" marR="0" lvl="0" indent="0" algn="l" defTabSz="914400" rtl="0" eaLnBrk="1" fontAlgn="auto" latinLnBrk="0" hangingPunct="1">
-              <a:lnSpc>
-                <a:spcPct val="100000"/>
-              </a:lnSpc>
-              <a:spcBef>
-                <a:spcPts val="0"/>
-              </a:spcBef>
-              <a:spcAft>
-                <a:spcPts val="0"/>
-              </a:spcAft>
-              <a:buClrTx/>
-              <a:buSzTx/>
-              <a:buFontTx/>
-              <a:buNone/>
-              <a:tabLst/>
-              <a:defRPr/>
-            </a:pPr>
-            <a:r>
-              <a:rPr lang="en-US" sz="1800" dirty="0">
-                <a:effectLst/>
-                <a:latin typeface="Calibri" panose="020F0502020204030204" pitchFamily="34" charset="0"/>
-                <a:ea typeface="Times New Roman" panose="02020603050405020304" pitchFamily="18" charset="0"/>
-                <a:cs typeface="Times New Roman" panose="02020603050405020304" pitchFamily="18" charset="0"/>
-              </a:rPr>
-              <a:t>Advanced statistical procedures are required to analyze this kind of relationship</a:t>
-            </a:r>
-            <a:endParaRPr lang="en-US" sz="1800" dirty="0">
-              <a:effectLst/>
-              <a:latin typeface="New York"/>
-              <a:ea typeface="Times New Roman" panose="02020603050405020304" pitchFamily="18" charset="0"/>
-              <a:cs typeface="Times New Roman" panose="02020603050405020304" pitchFamily="18" charset="0"/>
-            </a:endParaRPr>
-          </a:p>
-          <a:p>
-            <a:endParaRPr lang="en-US" dirty="0"/>
           </a:p>
         </p:txBody>
       </p:sp>
@@ -14203,7 +14180,7 @@
           <a:p>
             <a:fld id="{BC849E9A-41F7-4779-A581-48A7C374A227}" type="slidenum">
               <a:rPr lang="en-US" smtClean="0"/>
-              <a:t>13</a:t>
+              <a:t>12</a:t>
             </a:fld>
             <a:endParaRPr lang="en-US" dirty="0"/>
           </a:p>
@@ -14212,7 +14189,7 @@
     </p:spTree>
     <p:extLst>
       <p:ext uri="{BB962C8B-B14F-4D97-AF65-F5344CB8AC3E}">
-        <p14:creationId xmlns:p14="http://schemas.microsoft.com/office/powerpoint/2010/main" val="3420290178"/>
+        <p14:creationId xmlns:p14="http://schemas.microsoft.com/office/powerpoint/2010/main" val="3277015616"/>
       </p:ext>
     </p:extLst>
   </p:cSld>
@@ -14266,19 +14243,54 @@
           <a:bodyPr/>
           <a:lstStyle/>
           <a:p>
-            <a:pPr marL="0" lvl="0" indent="0" algn="l" rtl="0">
+            <a:r>
+              <a:rPr lang="en-US" dirty="0"/>
+              <a:t>What we’ve discussed so far is just linear relationship or linear association between satisfaction and laptop cost. </a:t>
+            </a:r>
+            <a:br>
+              <a:rPr lang="en-US" dirty="0"/>
+            </a:br>
+            <a:r>
+              <a:rPr lang="en-US" dirty="0"/>
+              <a:t>But this relationship could also be non-linear </a:t>
+            </a:r>
+          </a:p>
+          <a:p>
+            <a:endParaRPr lang="en-US" dirty="0"/>
+          </a:p>
+          <a:p>
+            <a:pPr marL="0" marR="0" lvl="0" indent="0" algn="l" defTabSz="914400" rtl="0" eaLnBrk="1" fontAlgn="auto" latinLnBrk="0" hangingPunct="1">
+              <a:lnSpc>
+                <a:spcPct val="100000"/>
+              </a:lnSpc>
               <a:spcBef>
                 <a:spcPts val="0"/>
               </a:spcBef>
               <a:spcAft>
                 <a:spcPts val="0"/>
               </a:spcAft>
+              <a:buClrTx/>
+              <a:buSzTx/>
+              <a:buFontTx/>
               <a:buNone/>
+              <a:tabLst/>
+              <a:defRPr/>
             </a:pPr>
             <a:r>
-              <a:rPr lang="en-US" dirty="0"/>
-              <a:t>Interpret the first example for students </a:t>
+              <a:rPr lang="en-US" sz="1800" dirty="0">
+                <a:effectLst/>
+                <a:latin typeface="Calibri" panose="020F0502020204030204" pitchFamily="34" charset="0"/>
+                <a:ea typeface="Times New Roman" panose="02020603050405020304" pitchFamily="18" charset="0"/>
+                <a:cs typeface="Times New Roman" panose="02020603050405020304" pitchFamily="18" charset="0"/>
+              </a:rPr>
+              <a:t>Advanced statistical procedures are required to analyze this kind of relationship</a:t>
             </a:r>
+            <a:endParaRPr lang="en-US" sz="1800" dirty="0">
+              <a:effectLst/>
+              <a:latin typeface="New York"/>
+              <a:ea typeface="Times New Roman" panose="02020603050405020304" pitchFamily="18" charset="0"/>
+              <a:cs typeface="Times New Roman" panose="02020603050405020304" pitchFamily="18" charset="0"/>
+            </a:endParaRPr>
           </a:p>
           <a:p>
             <a:endParaRPr lang="en-US" dirty="0"/>
@@ -14302,7 +14314,7 @@
           <a:p>
             <a:fld id="{BC849E9A-41F7-4779-A581-48A7C374A227}" type="slidenum">
               <a:rPr lang="en-US" smtClean="0"/>
-              <a:t>14</a:t>
+              <a:t>13</a:t>
             </a:fld>
             <a:endParaRPr lang="en-US" dirty="0"/>
           </a:p>
@@ -14311,7 +14323,7 @@
     </p:spTree>
     <p:extLst>
       <p:ext uri="{BB962C8B-B14F-4D97-AF65-F5344CB8AC3E}">
-        <p14:creationId xmlns:p14="http://schemas.microsoft.com/office/powerpoint/2010/main" val="2280647067"/>
+        <p14:creationId xmlns:p14="http://schemas.microsoft.com/office/powerpoint/2010/main" val="3420290178"/>
       </p:ext>
     </p:extLst>
   </p:cSld>
@@ -14365,19 +14377,22 @@
           <a:bodyPr/>
           <a:lstStyle/>
           <a:p>
+            <a:pPr marL="0" lvl="0" indent="0" algn="l" rtl="0">
+              <a:spcBef>
+                <a:spcPts val="0"/>
+              </a:spcBef>
+              <a:spcAft>
+                <a:spcPts val="0"/>
+              </a:spcAft>
+              <a:buNone/>
+            </a:pPr>
             <a:r>
               <a:rPr lang="en-US" dirty="0"/>
-              <a:t>Let students answer </a:t>
+              <a:t>Interpret the first example for students </a:t>
             </a:r>
           </a:p>
           <a:p>
             <a:endParaRPr lang="en-US" dirty="0"/>
-          </a:p>
-          <a:p>
-            <a:r>
-              <a:rPr lang="en-US" dirty="0"/>
-              <a:t>I hope by now you understand how to interpret your result to answer association questions. </a:t>
-            </a:r>
           </a:p>
         </p:txBody>
       </p:sp>
@@ -14398,7 +14413,7 @@
           <a:p>
             <a:fld id="{BC849E9A-41F7-4779-A581-48A7C374A227}" type="slidenum">
               <a:rPr lang="en-US" smtClean="0"/>
-              <a:t>15</a:t>
+              <a:t>14</a:t>
             </a:fld>
             <a:endParaRPr lang="en-US" dirty="0"/>
           </a:p>
@@ -14407,7 +14422,7 @@
     </p:spTree>
     <p:extLst>
       <p:ext uri="{BB962C8B-B14F-4D97-AF65-F5344CB8AC3E}">
-        <p14:creationId xmlns:p14="http://schemas.microsoft.com/office/powerpoint/2010/main" val="1561155126"/>
+        <p14:creationId xmlns:p14="http://schemas.microsoft.com/office/powerpoint/2010/main" val="2280647067"/>
       </p:ext>
     </p:extLst>
   </p:cSld>
@@ -14463,31 +14478,17 @@
           <a:p>
             <a:r>
               <a:rPr lang="en-US" dirty="0"/>
-              <a:t>Back to the project, </a:t>
+              <a:t>Let students answer </a:t>
             </a:r>
+          </a:p>
+          <a:p>
+            <a:endParaRPr lang="en-US" dirty="0"/>
           </a:p>
           <a:p>
             <a:r>
               <a:rPr lang="en-US" dirty="0"/>
-              <a:t>If your </a:t>
+              <a:t>I hope by now you understand how to interpret your result to answer association questions. </a:t>
             </a:r>
-            <a:r>
-              <a:rPr lang="en-US" dirty="0" err="1"/>
-              <a:t>RQ</a:t>
-            </a:r>
-            <a:r>
-              <a:rPr lang="en-US" dirty="0"/>
-              <a:t> is does workers’ incomes increase as their ages increase? </a:t>
-            </a:r>
-          </a:p>
-          <a:p>
-            <a:r>
-              <a:rPr lang="en-US" dirty="0"/>
-              <a:t>Then, your questionnaire questions should be what’s your age and what’s your income? </a:t>
-            </a:r>
-          </a:p>
-          <a:p>
-            <a:endParaRPr lang="en-US" dirty="0"/>
           </a:p>
         </p:txBody>
       </p:sp>
@@ -14508,7 +14509,7 @@
           <a:p>
             <a:fld id="{BC849E9A-41F7-4779-A581-48A7C374A227}" type="slidenum">
               <a:rPr lang="en-US" smtClean="0"/>
-              <a:t>16</a:t>
+              <a:t>15</a:t>
             </a:fld>
             <a:endParaRPr lang="en-US" dirty="0"/>
           </a:p>
@@ -14517,7 +14518,7 @@
     </p:spTree>
     <p:extLst>
       <p:ext uri="{BB962C8B-B14F-4D97-AF65-F5344CB8AC3E}">
-        <p14:creationId xmlns:p14="http://schemas.microsoft.com/office/powerpoint/2010/main" val="136380927"/>
+        <p14:creationId xmlns:p14="http://schemas.microsoft.com/office/powerpoint/2010/main" val="1561155126"/>
       </p:ext>
     </p:extLst>
   </p:cSld>
@@ -14573,65 +14574,28 @@
           <a:p>
             <a:r>
               <a:rPr lang="en-US" dirty="0"/>
-              <a:t>And then, after running your analysis you find that your correlation coefficient is 0.8 </a:t>
+              <a:t>Back to the project, </a:t>
             </a:r>
           </a:p>
           <a:p>
             <a:r>
               <a:rPr lang="en-US" dirty="0"/>
-              <a:t>Your conclusion would be…</a:t>
+              <a:t>If your </a:t>
             </a:r>
-          </a:p>
-          <a:p>
-            <a:endParaRPr lang="en-US" dirty="0"/>
-          </a:p>
-          <a:p>
+            <a:r>
+              <a:rPr lang="en-US" dirty="0" err="1"/>
+              <a:t>RQ</a:t>
+            </a:r>
             <a:r>
               <a:rPr lang="en-US" dirty="0"/>
-              <a:t>Here are some examples for correlation visualization </a:t>
+              <a:t> is does workers’ incomes increase as their ages increase? </a:t>
             </a:r>
-          </a:p>
-          <a:p>
-            <a:endParaRPr lang="en-US" dirty="0"/>
           </a:p>
           <a:p>
             <a:r>
               <a:rPr lang="en-US" dirty="0"/>
-              <a:t>Notice that we do not claim that higher age causes higher income or vice versa, because correlation does not mean causation. </a:t>
+              <a:t>Then, your questionnaire questions should be what’s your age and what’s your income? </a:t>
             </a:r>
-          </a:p>
-          <a:p>
-            <a:r>
-              <a:rPr lang="en-US" dirty="0"/>
-              <a:t>Does anybody remember what the other two conditions to establish causality besides correlation?</a:t>
-            </a:r>
-          </a:p>
-          <a:p>
-            <a:endParaRPr lang="en-US" dirty="0"/>
-          </a:p>
-          <a:p>
-            <a:r>
-              <a:rPr lang="en-US" dirty="0"/>
-              <a:t>Go to Word docs (correlation)</a:t>
-            </a:r>
-          </a:p>
-          <a:p>
-            <a:endParaRPr lang="en-US" dirty="0"/>
-          </a:p>
-          <a:p>
-            <a:r>
-              <a:rPr lang="en-US" dirty="0"/>
-              <a:t>Then go to excel to do analysis</a:t>
-            </a:r>
-          </a:p>
-          <a:p>
-            <a:r>
-              <a:rPr lang="en-US" dirty="0"/>
-              <a:t>Then to R for visualization </a:t>
-            </a:r>
-          </a:p>
-          <a:p>
-            <a:endParaRPr lang="en-US" dirty="0"/>
           </a:p>
           <a:p>
             <a:endParaRPr lang="en-US" dirty="0"/>
@@ -14655,7 +14619,7 @@
           <a:p>
             <a:fld id="{BC849E9A-41F7-4779-A581-48A7C374A227}" type="slidenum">
               <a:rPr lang="en-US" smtClean="0"/>
-              <a:t>17</a:t>
+              <a:t>16</a:t>
             </a:fld>
             <a:endParaRPr lang="en-US" dirty="0"/>
           </a:p>
@@ -14664,7 +14628,7 @@
     </p:spTree>
     <p:extLst>
       <p:ext uri="{BB962C8B-B14F-4D97-AF65-F5344CB8AC3E}">
-        <p14:creationId xmlns:p14="http://schemas.microsoft.com/office/powerpoint/2010/main" val="3036239250"/>
+        <p14:creationId xmlns:p14="http://schemas.microsoft.com/office/powerpoint/2010/main" val="136380927"/>
       </p:ext>
     </p:extLst>
   </p:cSld>
@@ -14720,8 +14684,65 @@
           <a:p>
             <a:r>
               <a:rPr lang="en-US" dirty="0"/>
-              <a:t>Now, we will cover chapter 20 which I’ll say less cognitively demanding</a:t>
+              <a:t>And then, after running your analysis you find that your correlation coefficient is 0.8 </a:t>
             </a:r>
+          </a:p>
+          <a:p>
+            <a:r>
+              <a:rPr lang="en-US" dirty="0"/>
+              <a:t>Your conclusion would be…</a:t>
+            </a:r>
+          </a:p>
+          <a:p>
+            <a:endParaRPr lang="en-US" dirty="0"/>
+          </a:p>
+          <a:p>
+            <a:r>
+              <a:rPr lang="en-US" dirty="0"/>
+              <a:t>Here are some examples for correlation visualization </a:t>
+            </a:r>
+          </a:p>
+          <a:p>
+            <a:endParaRPr lang="en-US" dirty="0"/>
+          </a:p>
+          <a:p>
+            <a:r>
+              <a:rPr lang="en-US" dirty="0"/>
+              <a:t>Notice that we do not claim that higher age causes higher income or vice versa, because correlation does not mean causation. </a:t>
+            </a:r>
+          </a:p>
+          <a:p>
+            <a:r>
+              <a:rPr lang="en-US" dirty="0"/>
+              <a:t>Does anybody remember what the other two conditions to establish causality besides correlation?</a:t>
+            </a:r>
+          </a:p>
+          <a:p>
+            <a:endParaRPr lang="en-US" dirty="0"/>
+          </a:p>
+          <a:p>
+            <a:r>
+              <a:rPr lang="en-US" dirty="0"/>
+              <a:t>Go to Word docs (correlation)</a:t>
+            </a:r>
+          </a:p>
+          <a:p>
+            <a:endParaRPr lang="en-US" dirty="0"/>
+          </a:p>
+          <a:p>
+            <a:r>
+              <a:rPr lang="en-US" dirty="0"/>
+              <a:t>Then go to excel to do analysis</a:t>
+            </a:r>
+          </a:p>
+          <a:p>
+            <a:r>
+              <a:rPr lang="en-US" dirty="0"/>
+              <a:t>Then to R for visualization </a:t>
+            </a:r>
+          </a:p>
+          <a:p>
+            <a:endParaRPr lang="en-US" dirty="0"/>
           </a:p>
           <a:p>
             <a:endParaRPr lang="en-US" dirty="0"/>
@@ -14745,7 +14766,7 @@
           <a:p>
             <a:fld id="{BC849E9A-41F7-4779-A581-48A7C374A227}" type="slidenum">
               <a:rPr lang="en-US" smtClean="0"/>
-              <a:t>18</a:t>
+              <a:t>17</a:t>
             </a:fld>
             <a:endParaRPr lang="en-US" dirty="0"/>
           </a:p>
@@ -14754,7 +14775,7 @@
     </p:spTree>
     <p:extLst>
       <p:ext uri="{BB962C8B-B14F-4D97-AF65-F5344CB8AC3E}">
-        <p14:creationId xmlns:p14="http://schemas.microsoft.com/office/powerpoint/2010/main" val="930879460"/>
+        <p14:creationId xmlns:p14="http://schemas.microsoft.com/office/powerpoint/2010/main" val="3036239250"/>
       </p:ext>
     </p:extLst>
   </p:cSld>
@@ -14810,8 +14831,11 @@
           <a:p>
             <a:r>
               <a:rPr lang="en-US" dirty="0"/>
-              <a:t>These are overall learning objectives</a:t>
+              <a:t>Now, we will cover chapter 20 which I’ll say less cognitively demanding</a:t>
             </a:r>
+          </a:p>
+          <a:p>
+            <a:endParaRPr lang="en-US" dirty="0"/>
           </a:p>
         </p:txBody>
       </p:sp>
@@ -14832,7 +14856,7 @@
           <a:p>
             <a:fld id="{BC849E9A-41F7-4779-A581-48A7C374A227}" type="slidenum">
               <a:rPr lang="en-US" smtClean="0"/>
-              <a:t>19</a:t>
+              <a:t>18</a:t>
             </a:fld>
             <a:endParaRPr lang="en-US" dirty="0"/>
           </a:p>
@@ -14841,7 +14865,7 @@
     </p:spTree>
     <p:extLst>
       <p:ext uri="{BB962C8B-B14F-4D97-AF65-F5344CB8AC3E}">
-        <p14:creationId xmlns:p14="http://schemas.microsoft.com/office/powerpoint/2010/main" val="2069854961"/>
+        <p14:creationId xmlns:p14="http://schemas.microsoft.com/office/powerpoint/2010/main" val="930879460"/>
       </p:ext>
     </p:extLst>
   </p:cSld>
@@ -14897,24 +14921,8 @@
           <a:p>
             <a:r>
               <a:rPr lang="en-US" dirty="0"/>
-              <a:t>Written report is all about how you communicate your result with your audience. </a:t>
+              <a:t>These are overall learning objectives</a:t>
             </a:r>
-            <a:br>
-              <a:rPr lang="en-US" dirty="0"/>
-            </a:br>
-            <a:r>
-              <a:rPr lang="en-US" dirty="0"/>
-              <a:t>Even if you run all kinds of fancy tests, if you cannot relay the results or be able to interpret and communicate them with your boss. Then, you can appear like you did nothing right?</a:t>
-            </a:r>
-          </a:p>
-          <a:p>
-            <a:r>
-              <a:rPr lang="en-US" dirty="0"/>
-              <a:t>A near-perfect research can get lost in the clutter of a poorly written report</a:t>
-            </a:r>
-          </a:p>
-          <a:p>
-            <a:endParaRPr lang="en-US" dirty="0"/>
           </a:p>
         </p:txBody>
       </p:sp>
@@ -14935,7 +14943,7 @@
           <a:p>
             <a:fld id="{BC849E9A-41F7-4779-A581-48A7C374A227}" type="slidenum">
               <a:rPr lang="en-US" smtClean="0"/>
-              <a:t>20</a:t>
+              <a:t>19</a:t>
             </a:fld>
             <a:endParaRPr lang="en-US" dirty="0"/>
           </a:p>
@@ -14944,7 +14952,7 @@
     </p:spTree>
     <p:extLst>
       <p:ext uri="{BB962C8B-B14F-4D97-AF65-F5344CB8AC3E}">
-        <p14:creationId xmlns:p14="http://schemas.microsoft.com/office/powerpoint/2010/main" val="2756021941"/>
+        <p14:creationId xmlns:p14="http://schemas.microsoft.com/office/powerpoint/2010/main" val="2069854961"/>
       </p:ext>
     </p:extLst>
   </p:cSld>
@@ -15000,20 +15008,24 @@
           <a:p>
             <a:r>
               <a:rPr lang="en-US" dirty="0"/>
-              <a:t>However, there is also the paradox of completeness </a:t>
+              <a:t>Written report is all about how you communicate your result with your audience. </a:t>
             </a:r>
-          </a:p>
-          <a:p>
+            <a:br>
+              <a:rPr lang="en-US" dirty="0"/>
+            </a:br>
             <a:r>
               <a:rPr lang="en-US" dirty="0"/>
-              <a:t>People who are involved in the analysis process usually want to be as complete as possible because they have done so much works that they want to show off how much work they have done. However, they can also run the risk of being too complete, that might stray their audience from the important message or takeaways. </a:t>
+              <a:t>Even if you run all kinds of fancy tests, if you cannot relay the results or be able to interpret and communicate them with your boss. Then, you can appear like you did nothing right?</a:t>
             </a:r>
           </a:p>
           <a:p>
             <a:r>
               <a:rPr lang="en-US" dirty="0"/>
-              <a:t>On the other hand, people can also be deceiving that they can strategically omit stuffs, tests that did not fall into their prediction can be an example. In this case, you as a co-worker or co-researcher need to step up and encourage completeness. </a:t>
+              <a:t>A near-perfect research can get lost in the clutter of a poorly written report</a:t>
             </a:r>
+          </a:p>
+          <a:p>
+            <a:endParaRPr lang="en-US" dirty="0"/>
           </a:p>
         </p:txBody>
       </p:sp>
@@ -15034,7 +15046,7 @@
           <a:p>
             <a:fld id="{BC849E9A-41F7-4779-A581-48A7C374A227}" type="slidenum">
               <a:rPr lang="en-US" smtClean="0"/>
-              <a:t>21</a:t>
+              <a:t>20</a:t>
             </a:fld>
             <a:endParaRPr lang="en-US" dirty="0"/>
           </a:p>
@@ -15043,7 +15055,7 @@
     </p:spTree>
     <p:extLst>
       <p:ext uri="{BB962C8B-B14F-4D97-AF65-F5344CB8AC3E}">
-        <p14:creationId xmlns:p14="http://schemas.microsoft.com/office/powerpoint/2010/main" val="3275574818"/>
+        <p14:creationId xmlns:p14="http://schemas.microsoft.com/office/powerpoint/2010/main" val="2756021941"/>
       </p:ext>
     </p:extLst>
   </p:cSld>
@@ -15099,13 +15111,19 @@
           <a:p>
             <a:r>
               <a:rPr lang="en-US" dirty="0"/>
-              <a:t>You just don’t want to be deceiving or report incorrect information. </a:t>
+              <a:t>However, there is also the paradox of completeness </a:t>
             </a:r>
           </a:p>
           <a:p>
             <a:r>
               <a:rPr lang="en-US" dirty="0"/>
-              <a:t>If you have two wrong datasets or data analyses, it doesn’t mean after averaging them you have a correct one. </a:t>
+              <a:t>People who are involved in the analysis process usually want to be as complete as possible because they have done so much works that they want to show off how much work they have done. However, they can also run the risk of being too complete, that might stray their audience from the important message or takeaways. </a:t>
+            </a:r>
+          </a:p>
+          <a:p>
+            <a:r>
+              <a:rPr lang="en-US" dirty="0"/>
+              <a:t>On the other hand, people can also be deceiving that they can strategically omit stuffs, tests that did not fall into their prediction can be an example. In this case, you as a co-worker or co-researcher need to step up and encourage completeness. </a:t>
             </a:r>
           </a:p>
         </p:txBody>
@@ -15127,7 +15145,7 @@
           <a:p>
             <a:fld id="{BC849E9A-41F7-4779-A581-48A7C374A227}" type="slidenum">
               <a:rPr lang="en-US" smtClean="0"/>
-              <a:t>22</a:t>
+              <a:t>21</a:t>
             </a:fld>
             <a:endParaRPr lang="en-US" dirty="0"/>
           </a:p>
@@ -15136,7 +15154,7 @@
     </p:spTree>
     <p:extLst>
       <p:ext uri="{BB962C8B-B14F-4D97-AF65-F5344CB8AC3E}">
-        <p14:creationId xmlns:p14="http://schemas.microsoft.com/office/powerpoint/2010/main" val="3486695606"/>
+        <p14:creationId xmlns:p14="http://schemas.microsoft.com/office/powerpoint/2010/main" val="3275574818"/>
       </p:ext>
     </p:extLst>
   </p:cSld>
@@ -15190,10 +15208,7 @@
           <a:bodyPr/>
           <a:lstStyle/>
           <a:p>
-            <a:r>
-              <a:rPr lang="en-US" dirty="0"/>
-              <a:t>C</a:t>
-            </a:r>
+            <a:endParaRPr lang="en-US" dirty="0"/>
           </a:p>
         </p:txBody>
       </p:sp>
@@ -15214,7 +15229,7 @@
           <a:p>
             <a:fld id="{BC849E9A-41F7-4779-A581-48A7C374A227}" type="slidenum">
               <a:rPr lang="en-US" smtClean="0"/>
-              <a:t>3</a:t>
+              <a:t>2</a:t>
             </a:fld>
             <a:endParaRPr lang="en-US" dirty="0"/>
           </a:p>
@@ -15223,7 +15238,7 @@
     </p:spTree>
     <p:extLst>
       <p:ext uri="{BB962C8B-B14F-4D97-AF65-F5344CB8AC3E}">
-        <p14:creationId xmlns:p14="http://schemas.microsoft.com/office/powerpoint/2010/main" val="3941326707"/>
+        <p14:creationId xmlns:p14="http://schemas.microsoft.com/office/powerpoint/2010/main" val="4290399702"/>
       </p:ext>
     </p:extLst>
   </p:cSld>
@@ -15279,13 +15294,13 @@
           <a:p>
             <a:r>
               <a:rPr lang="en-US" dirty="0"/>
-              <a:t>These are examples of inaccuracy </a:t>
+              <a:t>You just don’t want to be deceiving or report incorrect information. </a:t>
             </a:r>
           </a:p>
           <a:p>
             <a:r>
               <a:rPr lang="en-US" dirty="0"/>
-              <a:t>You can refer to them when you do your project report </a:t>
+              <a:t>If you have two wrong datasets or data analyses, it doesn’t mean after averaging them you have a correct one. </a:t>
             </a:r>
           </a:p>
         </p:txBody>
@@ -15307,7 +15322,7 @@
           <a:p>
             <a:fld id="{BC849E9A-41F7-4779-A581-48A7C374A227}" type="slidenum">
               <a:rPr lang="en-US" smtClean="0"/>
-              <a:t>23</a:t>
+              <a:t>22</a:t>
             </a:fld>
             <a:endParaRPr lang="en-US" dirty="0"/>
           </a:p>
@@ -15316,7 +15331,7 @@
     </p:spTree>
     <p:extLst>
       <p:ext uri="{BB962C8B-B14F-4D97-AF65-F5344CB8AC3E}">
-        <p14:creationId xmlns:p14="http://schemas.microsoft.com/office/powerpoint/2010/main" val="1803303781"/>
+        <p14:creationId xmlns:p14="http://schemas.microsoft.com/office/powerpoint/2010/main" val="3486695606"/>
       </p:ext>
     </p:extLst>
   </p:cSld>
@@ -15372,13 +15387,13 @@
           <a:p>
             <a:r>
               <a:rPr lang="en-US" dirty="0"/>
-              <a:t>You also want clarity in your report. It just means you need to clearly communicate the results and the next step to your managers. </a:t>
+              <a:t>These are examples of inaccuracy </a:t>
             </a:r>
           </a:p>
           <a:p>
             <a:r>
               <a:rPr lang="en-US" dirty="0"/>
-              <a:t>Remember the whole purpose of your research is find evidence that support an alternative as the best option to take. </a:t>
+              <a:t>You can refer to them when you do your project report </a:t>
             </a:r>
           </a:p>
         </p:txBody>
@@ -15400,7 +15415,7 @@
           <a:p>
             <a:fld id="{BC849E9A-41F7-4779-A581-48A7C374A227}" type="slidenum">
               <a:rPr lang="en-US" smtClean="0"/>
-              <a:t>24</a:t>
+              <a:t>23</a:t>
             </a:fld>
             <a:endParaRPr lang="en-US" dirty="0"/>
           </a:p>
@@ -15409,7 +15424,7 @@
     </p:spTree>
     <p:extLst>
       <p:ext uri="{BB962C8B-B14F-4D97-AF65-F5344CB8AC3E}">
-        <p14:creationId xmlns:p14="http://schemas.microsoft.com/office/powerpoint/2010/main" val="55061176"/>
+        <p14:creationId xmlns:p14="http://schemas.microsoft.com/office/powerpoint/2010/main" val="1803303781"/>
       </p:ext>
     </p:extLst>
   </p:cSld>
@@ -15465,7 +15480,13 @@
           <a:p>
             <a:r>
               <a:rPr lang="en-US" dirty="0"/>
-              <a:t>Clarity can be achieved by </a:t>
+              <a:t>You also want clarity in your report. It just means you need to clearly communicate the results and the next step to your managers. </a:t>
+            </a:r>
+          </a:p>
+          <a:p>
+            <a:r>
+              <a:rPr lang="en-US" dirty="0"/>
+              <a:t>Remember the whole purpose of your research is find evidence that support an alternative as the best option to take. </a:t>
             </a:r>
           </a:p>
         </p:txBody>
@@ -15487,7 +15508,7 @@
           <a:p>
             <a:fld id="{BC849E9A-41F7-4779-A581-48A7C374A227}" type="slidenum">
               <a:rPr lang="en-US" smtClean="0"/>
-              <a:t>25</a:t>
+              <a:t>24</a:t>
             </a:fld>
             <a:endParaRPr lang="en-US" dirty="0"/>
           </a:p>
@@ -15496,7 +15517,7 @@
     </p:spTree>
     <p:extLst>
       <p:ext uri="{BB962C8B-B14F-4D97-AF65-F5344CB8AC3E}">
-        <p14:creationId xmlns:p14="http://schemas.microsoft.com/office/powerpoint/2010/main" val="2403704050"/>
+        <p14:creationId xmlns:p14="http://schemas.microsoft.com/office/powerpoint/2010/main" val="55061176"/>
       </p:ext>
     </p:extLst>
   </p:cSld>
@@ -15552,49 +15573,7 @@
           <a:p>
             <a:r>
               <a:rPr lang="en-US" dirty="0"/>
-              <a:t>Here is a formal written research report outline. You can review these slides later. </a:t>
-            </a:r>
-          </a:p>
-          <a:p>
-            <a:r>
-              <a:rPr lang="en-US" dirty="0"/>
-              <a:t>However, in this class I do not need you to write pages long of report. </a:t>
-            </a:r>
-          </a:p>
-          <a:p>
-            <a:r>
-              <a:rPr lang="en-US" dirty="0"/>
-              <a:t>The example here is the report outline in your textbook. Our expected format would be similar, but with some differences </a:t>
-            </a:r>
-          </a:p>
-          <a:p>
-            <a:r>
-              <a:rPr lang="en-US" dirty="0"/>
-              <a:t>Hence, you should not consult this slide for your report, but the project report guideline </a:t>
-            </a:r>
-          </a:p>
-          <a:p>
-            <a:endParaRPr lang="en-US" dirty="0"/>
-          </a:p>
-          <a:p>
-            <a:r>
-              <a:rPr lang="en-US" dirty="0"/>
-              <a:t>If you can open an example of final report. We can go over my expectation together </a:t>
-            </a:r>
-          </a:p>
-          <a:p>
-            <a:endParaRPr lang="en-US" dirty="0"/>
-          </a:p>
-          <a:p>
-            <a:r>
-              <a:rPr lang="en-US" dirty="0"/>
-              <a:t>Report Guideline: https://github.com/mikenguyen13/mar4050_F21/blob/master/project_assignment/written_report/Project%20Report%20Guideline.pdf</a:t>
-            </a:r>
-          </a:p>
-          <a:p>
-            <a:r>
-              <a:rPr lang="en-US" dirty="0"/>
-              <a:t>Example: https://github.com/mikenguyen13/mar4050_F21/blob/master/project_assignment/written_report/example1%20SlideDoc%20research%20report.pdf</a:t>
+              <a:t>Clarity can be achieved by </a:t>
             </a:r>
           </a:p>
         </p:txBody>
@@ -15616,7 +15595,7 @@
           <a:p>
             <a:fld id="{BC849E9A-41F7-4779-A581-48A7C374A227}" type="slidenum">
               <a:rPr lang="en-US" smtClean="0"/>
-              <a:t>27</a:t>
+              <a:t>25</a:t>
             </a:fld>
             <a:endParaRPr lang="en-US" dirty="0"/>
           </a:p>
@@ -15625,7 +15604,7 @@
     </p:spTree>
     <p:extLst>
       <p:ext uri="{BB962C8B-B14F-4D97-AF65-F5344CB8AC3E}">
-        <p14:creationId xmlns:p14="http://schemas.microsoft.com/office/powerpoint/2010/main" val="3083969405"/>
+        <p14:creationId xmlns:p14="http://schemas.microsoft.com/office/powerpoint/2010/main" val="2403704050"/>
       </p:ext>
     </p:extLst>
   </p:cSld>
@@ -15679,73 +15658,52 @@
           <a:bodyPr/>
           <a:lstStyle/>
           <a:p>
-            <a:pPr marL="0" marR="0" lvl="0" indent="0" algn="l" defTabSz="914400" rtl="0" eaLnBrk="1" fontAlgn="auto" latinLnBrk="0" hangingPunct="1">
-              <a:lnSpc>
-                <a:spcPct val="100000"/>
-              </a:lnSpc>
-              <a:spcBef>
-                <a:spcPts val="0"/>
-              </a:spcBef>
-              <a:spcAft>
-                <a:spcPts val="0"/>
-              </a:spcAft>
-              <a:buClrTx/>
-              <a:buSzTx/>
-              <a:buFontTx/>
-              <a:buNone/>
-              <a:tabLst/>
-              <a:defRPr/>
-            </a:pPr>
             <a:r>
-              <a:rPr lang="en-US" sz="1200" dirty="0"/>
-              <a:t>the most important part of the report </a:t>
+              <a:rPr lang="en-US" dirty="0"/>
+              <a:t>Here is a formal written research report outline. You can review these slides later. </a:t>
             </a:r>
           </a:p>
           <a:p>
-            <a:pPr marL="0" marR="0" lvl="0" indent="0" algn="l" defTabSz="914400" rtl="0" eaLnBrk="1" fontAlgn="auto" latinLnBrk="0" hangingPunct="1">
-              <a:lnSpc>
-                <a:spcPct val="100000"/>
-              </a:lnSpc>
-              <a:spcBef>
-                <a:spcPts val="0"/>
-              </a:spcBef>
-              <a:spcAft>
-                <a:spcPts val="0"/>
-              </a:spcAft>
-              <a:buClrTx/>
-              <a:buSzTx/>
-              <a:buFontTx/>
-              <a:buNone/>
-              <a:tabLst/>
-              <a:defRPr/>
-            </a:pPr>
-            <a:endParaRPr lang="en-US" sz="1200" dirty="0"/>
-          </a:p>
-          <a:p>
-            <a:pPr marL="0" marR="0" lvl="0" indent="0" algn="l" defTabSz="914400" rtl="0" eaLnBrk="1" fontAlgn="auto" latinLnBrk="0" hangingPunct="1">
-              <a:lnSpc>
-                <a:spcPct val="100000"/>
-              </a:lnSpc>
-              <a:spcBef>
-                <a:spcPts val="0"/>
-              </a:spcBef>
-              <a:spcAft>
-                <a:spcPts val="0"/>
-              </a:spcAft>
-              <a:buClrTx/>
-              <a:buSzTx/>
-              <a:buFontTx/>
-              <a:buNone/>
-              <a:tabLst/>
-              <a:defRPr/>
-            </a:pPr>
             <a:r>
-              <a:rPr lang="en-US" sz="1200" dirty="0"/>
-              <a:t>Think about what you would most want to communicate about he project if you only had 60 seconds to do so.</a:t>
+              <a:rPr lang="en-US" dirty="0"/>
+              <a:t>However, in this class I do not need you to write pages long of report. </a:t>
             </a:r>
           </a:p>
           <a:p>
+            <a:r>
+              <a:rPr lang="en-US" dirty="0"/>
+              <a:t>The example here is the report outline in your textbook. Our expected format would be similar, but with some differences </a:t>
+            </a:r>
+          </a:p>
+          <a:p>
+            <a:r>
+              <a:rPr lang="en-US" dirty="0"/>
+              <a:t>Hence, you should not consult this slide for your report, but the project report guideline </a:t>
+            </a:r>
+          </a:p>
+          <a:p>
             <a:endParaRPr lang="en-US" dirty="0"/>
+          </a:p>
+          <a:p>
+            <a:r>
+              <a:rPr lang="en-US" dirty="0"/>
+              <a:t>If you can open an example of final report. We can go over my expectation together </a:t>
+            </a:r>
+          </a:p>
+          <a:p>
+            <a:endParaRPr lang="en-US" dirty="0"/>
+          </a:p>
+          <a:p>
+            <a:r>
+              <a:rPr lang="en-US" dirty="0"/>
+              <a:t>Report Guideline: https://github.com/mikenguyen13/mar4050_F21/blob/master/project_assignment/written_report/Project%20Report%20Guideline.pdf</a:t>
+            </a:r>
+          </a:p>
+          <a:p>
+            <a:r>
+              <a:rPr lang="en-US" dirty="0"/>
+              <a:t>Example: https://github.com/mikenguyen13/mar4050_F21/blob/master/project_assignment/written_report/example1%20SlideDoc%20research%20report.pdf</a:t>
+            </a:r>
           </a:p>
         </p:txBody>
       </p:sp>
@@ -15766,7 +15724,7 @@
           <a:p>
             <a:fld id="{BC849E9A-41F7-4779-A581-48A7C374A227}" type="slidenum">
               <a:rPr lang="en-US" smtClean="0"/>
-              <a:t>28</a:t>
+              <a:t>27</a:t>
             </a:fld>
             <a:endParaRPr lang="en-US" dirty="0"/>
           </a:p>
@@ -15775,7 +15733,7 @@
     </p:spTree>
     <p:extLst>
       <p:ext uri="{BB962C8B-B14F-4D97-AF65-F5344CB8AC3E}">
-        <p14:creationId xmlns:p14="http://schemas.microsoft.com/office/powerpoint/2010/main" val="2167025407"/>
+        <p14:creationId xmlns:p14="http://schemas.microsoft.com/office/powerpoint/2010/main" val="3083969405"/>
       </p:ext>
     </p:extLst>
   </p:cSld>
@@ -15829,9 +15787,69 @@
           <a:bodyPr/>
           <a:lstStyle/>
           <a:p>
+            <a:pPr marL="0" marR="0" lvl="0" indent="0" algn="l" defTabSz="914400" rtl="0" eaLnBrk="1" fontAlgn="auto" latinLnBrk="0" hangingPunct="1">
+              <a:lnSpc>
+                <a:spcPct val="100000"/>
+              </a:lnSpc>
+              <a:spcBef>
+                <a:spcPts val="0"/>
+              </a:spcBef>
+              <a:spcAft>
+                <a:spcPts val="0"/>
+              </a:spcAft>
+              <a:buClrTx/>
+              <a:buSzTx/>
+              <a:buFontTx/>
+              <a:buNone/>
+              <a:tabLst/>
+              <a:defRPr/>
+            </a:pPr>
             <a:r>
-              <a:rPr lang="en-US" dirty="0"/>
-              <a:t>Go over the mid-semester evaluation if have time </a:t>
+              <a:rPr lang="en-US" sz="1200" dirty="0"/>
+              <a:t>the most important part of the report </a:t>
+            </a:r>
+          </a:p>
+          <a:p>
+            <a:pPr marL="0" marR="0" lvl="0" indent="0" algn="l" defTabSz="914400" rtl="0" eaLnBrk="1" fontAlgn="auto" latinLnBrk="0" hangingPunct="1">
+              <a:lnSpc>
+                <a:spcPct val="100000"/>
+              </a:lnSpc>
+              <a:spcBef>
+                <a:spcPts val="0"/>
+              </a:spcBef>
+              <a:spcAft>
+                <a:spcPts val="0"/>
+              </a:spcAft>
+              <a:buClrTx/>
+              <a:buSzTx/>
+              <a:buFontTx/>
+              <a:buNone/>
+              <a:tabLst/>
+              <a:defRPr/>
+            </a:pPr>
+            <a:endParaRPr lang="en-US" sz="1200" dirty="0"/>
+          </a:p>
+          <a:p>
+            <a:pPr marL="0" marR="0" lvl="0" indent="0" algn="l" defTabSz="914400" rtl="0" eaLnBrk="1" fontAlgn="auto" latinLnBrk="0" hangingPunct="1">
+              <a:lnSpc>
+                <a:spcPct val="100000"/>
+              </a:lnSpc>
+              <a:spcBef>
+                <a:spcPts val="0"/>
+              </a:spcBef>
+              <a:spcAft>
+                <a:spcPts val="0"/>
+              </a:spcAft>
+              <a:buClrTx/>
+              <a:buSzTx/>
+              <a:buFontTx/>
+              <a:buNone/>
+              <a:tabLst/>
+              <a:defRPr/>
+            </a:pPr>
+            <a:r>
+              <a:rPr lang="en-US" sz="1200" dirty="0"/>
+              <a:t>Think about what you would most want to communicate about he project if you only had 60 seconds to do so.</a:t>
             </a:r>
           </a:p>
           <a:p>
@@ -15856,7 +15874,7 @@
           <a:p>
             <a:fld id="{BC849E9A-41F7-4779-A581-48A7C374A227}" type="slidenum">
               <a:rPr lang="en-US" smtClean="0"/>
-              <a:t>34</a:t>
+              <a:t>28</a:t>
             </a:fld>
             <a:endParaRPr lang="en-US" dirty="0"/>
           </a:p>
@@ -15865,7 +15883,7 @@
     </p:spTree>
     <p:extLst>
       <p:ext uri="{BB962C8B-B14F-4D97-AF65-F5344CB8AC3E}">
-        <p14:creationId xmlns:p14="http://schemas.microsoft.com/office/powerpoint/2010/main" val="3883761430"/>
+        <p14:creationId xmlns:p14="http://schemas.microsoft.com/office/powerpoint/2010/main" val="2167025407"/>
       </p:ext>
     </p:extLst>
   </p:cSld>
@@ -15921,15 +15939,11 @@
           <a:p>
             <a:r>
               <a:rPr lang="en-US" dirty="0"/>
-              <a:t>Go </a:t>
+              <a:t>Go over the mid-semester evaluation if have time </a:t>
             </a:r>
-            <a:r>
-              <a:rPr lang="en-US"/>
-              <a:t>to assignment 7 </a:t>
-            </a:r>
-          </a:p>
-          <a:p>
-            <a:endParaRPr lang="en-US"/>
+          </a:p>
+          <a:p>
+            <a:endParaRPr lang="en-US" dirty="0"/>
           </a:p>
         </p:txBody>
       </p:sp>
@@ -15950,6 +15964,100 @@
           <a:p>
             <a:fld id="{BC849E9A-41F7-4779-A581-48A7C374A227}" type="slidenum">
               <a:rPr lang="en-US" smtClean="0"/>
+              <a:t>34</a:t>
+            </a:fld>
+            <a:endParaRPr lang="en-US" dirty="0"/>
+          </a:p>
+        </p:txBody>
+      </p:sp>
+    </p:spTree>
+    <p:extLst>
+      <p:ext uri="{BB962C8B-B14F-4D97-AF65-F5344CB8AC3E}">
+        <p14:creationId xmlns:p14="http://schemas.microsoft.com/office/powerpoint/2010/main" val="3883761430"/>
+      </p:ext>
+    </p:extLst>
+  </p:cSld>
+  <p:clrMapOvr>
+    <a:masterClrMapping/>
+  </p:clrMapOvr>
+</p:notes>
+</file>
+
+<file path=ppt/notesSlides/notesSlide27.xml><?xml version="1.0" encoding="utf-8"?>
+<p:notes xmlns:a="http://schemas.openxmlformats.org/drawingml/2006/main" xmlns:r="http://schemas.openxmlformats.org/officeDocument/2006/relationships" xmlns:p="http://schemas.openxmlformats.org/presentationml/2006/main">
+  <p:cSld>
+    <p:spTree>
+      <p:nvGrpSpPr>
+        <p:cNvPr id="1" name=""/>
+        <p:cNvGrpSpPr/>
+        <p:nvPr/>
+      </p:nvGrpSpPr>
+      <p:grpSpPr>
+        <a:xfrm>
+          <a:off x="0" y="0"/>
+          <a:ext cx="0" cy="0"/>
+          <a:chOff x="0" y="0"/>
+          <a:chExt cx="0" cy="0"/>
+        </a:xfrm>
+      </p:grpSpPr>
+      <p:sp>
+        <p:nvSpPr>
+          <p:cNvPr id="2" name="Slide Image Placeholder 1"/>
+          <p:cNvSpPr>
+            <a:spLocks noGrp="1" noRot="1" noChangeAspect="1"/>
+          </p:cNvSpPr>
+          <p:nvPr>
+            <p:ph type="sldImg"/>
+          </p:nvPr>
+        </p:nvSpPr>
+        <p:spPr/>
+      </p:sp>
+      <p:sp>
+        <p:nvSpPr>
+          <p:cNvPr id="3" name="Notes Placeholder 2"/>
+          <p:cNvSpPr>
+            <a:spLocks noGrp="1"/>
+          </p:cNvSpPr>
+          <p:nvPr>
+            <p:ph type="body" idx="1"/>
+          </p:nvPr>
+        </p:nvSpPr>
+        <p:spPr/>
+        <p:txBody>
+          <a:bodyPr/>
+          <a:lstStyle/>
+          <a:p>
+            <a:r>
+              <a:rPr lang="en-US" dirty="0"/>
+              <a:t>Go </a:t>
+            </a:r>
+            <a:r>
+              <a:rPr lang="en-US"/>
+              <a:t>to assignment 7 </a:t>
+            </a:r>
+          </a:p>
+          <a:p>
+            <a:endParaRPr lang="en-US"/>
+          </a:p>
+        </p:txBody>
+      </p:sp>
+      <p:sp>
+        <p:nvSpPr>
+          <p:cNvPr id="4" name="Slide Number Placeholder 3"/>
+          <p:cNvSpPr>
+            <a:spLocks noGrp="1"/>
+          </p:cNvSpPr>
+          <p:nvPr>
+            <p:ph type="sldNum" sz="quarter" idx="5"/>
+          </p:nvPr>
+        </p:nvSpPr>
+        <p:spPr/>
+        <p:txBody>
+          <a:bodyPr/>
+          <a:lstStyle/>
+          <a:p>
+            <a:fld id="{BC849E9A-41F7-4779-A581-48A7C374A227}" type="slidenum">
+              <a:rPr lang="en-US" smtClean="0"/>
               <a:t>35</a:t>
             </a:fld>
             <a:endParaRPr lang="en-US" dirty="0"/>
@@ -15969,7 +16077,7 @@
 </p:notes>
 </file>
 
-<file path=ppt/notesSlides/notesSlide27.xml><?xml version="1.0" encoding="utf-8"?>
+<file path=ppt/notesSlides/notesSlide28.xml><?xml version="1.0" encoding="utf-8"?>
 <p:notes xmlns:a="http://schemas.openxmlformats.org/drawingml/2006/main" xmlns:r="http://schemas.openxmlformats.org/officeDocument/2006/relationships" xmlns:p="http://schemas.openxmlformats.org/presentationml/2006/main">
   <p:cSld>
     <p:spTree>
@@ -16317,10 +16425,7 @@
           <a:bodyPr/>
           <a:lstStyle/>
           <a:p>
-            <a:r>
-              <a:rPr lang="en-US" dirty="0"/>
-              <a:t>A</a:t>
-            </a:r>
+            <a:endParaRPr lang="en-US" dirty="0"/>
           </a:p>
         </p:txBody>
       </p:sp>
@@ -16341,7 +16446,7 @@
           <a:p>
             <a:fld id="{BC849E9A-41F7-4779-A581-48A7C374A227}" type="slidenum">
               <a:rPr lang="en-US" smtClean="0"/>
-              <a:t>4</a:t>
+              <a:t>3</a:t>
             </a:fld>
             <a:endParaRPr lang="en-US" dirty="0"/>
           </a:p>
@@ -16350,7 +16455,7 @@
     </p:spTree>
     <p:extLst>
       <p:ext uri="{BB962C8B-B14F-4D97-AF65-F5344CB8AC3E}">
-        <p14:creationId xmlns:p14="http://schemas.microsoft.com/office/powerpoint/2010/main" val="787029677"/>
+        <p14:creationId xmlns:p14="http://schemas.microsoft.com/office/powerpoint/2010/main" val="3941326707"/>
       </p:ext>
     </p:extLst>
   </p:cSld>
@@ -16404,54 +16509,6 @@
           <a:bodyPr/>
           <a:lstStyle/>
           <a:p>
-            <a:r>
-              <a:rPr lang="en-US" dirty="0"/>
-              <a:t>We have already covered descriptive </a:t>
-            </a:r>
-            <a:r>
-              <a:rPr lang="en-US" dirty="0" err="1"/>
-              <a:t>RQ</a:t>
-            </a:r>
-            <a:r>
-              <a:rPr lang="en-US" dirty="0"/>
-              <a:t>, in which we do some descriptive analyses regarding a variable. </a:t>
-            </a:r>
-          </a:p>
-          <a:p>
-            <a:r>
-              <a:rPr lang="en-US" dirty="0"/>
-              <a:t>It can be categorical or continuous </a:t>
-            </a:r>
-          </a:p>
-          <a:p>
-            <a:r>
-              <a:rPr lang="en-US" dirty="0"/>
-              <a:t>Then, we also covered difference </a:t>
-            </a:r>
-            <a:r>
-              <a:rPr lang="en-US" dirty="0" err="1"/>
-              <a:t>RQ</a:t>
-            </a:r>
-            <a:r>
-              <a:rPr lang="en-US" dirty="0"/>
-              <a:t>, in which the difference variable has to be categorical and analysis variable is continuous </a:t>
-            </a:r>
-          </a:p>
-          <a:p>
-            <a:r>
-              <a:rPr lang="en-US" dirty="0"/>
-              <a:t>Association </a:t>
-            </a:r>
-            <a:r>
-              <a:rPr lang="en-US" dirty="0" err="1"/>
-              <a:t>RQ</a:t>
-            </a:r>
-            <a:r>
-              <a:rPr lang="en-US" dirty="0"/>
-              <a:t> is between 2 continuous variables. </a:t>
-            </a:r>
-          </a:p>
-          <a:p>
             <a:endParaRPr lang="en-US" dirty="0"/>
           </a:p>
         </p:txBody>
@@ -16473,7 +16530,7 @@
           <a:p>
             <a:fld id="{BC849E9A-41F7-4779-A581-48A7C374A227}" type="slidenum">
               <a:rPr lang="en-US" smtClean="0"/>
-              <a:t>6</a:t>
+              <a:t>4</a:t>
             </a:fld>
             <a:endParaRPr lang="en-US" dirty="0"/>
           </a:p>
@@ -16482,7 +16539,7 @@
     </p:spTree>
     <p:extLst>
       <p:ext uri="{BB962C8B-B14F-4D97-AF65-F5344CB8AC3E}">
-        <p14:creationId xmlns:p14="http://schemas.microsoft.com/office/powerpoint/2010/main" val="255056152"/>
+        <p14:creationId xmlns:p14="http://schemas.microsoft.com/office/powerpoint/2010/main" val="787029677"/>
       </p:ext>
     </p:extLst>
   </p:cSld>
@@ -16538,8 +16595,53 @@
           <a:p>
             <a:r>
               <a:rPr lang="en-US" dirty="0"/>
-              <a:t>We will go into detail for the last question </a:t>
+              <a:t>We have already covered descriptive </a:t>
             </a:r>
+            <a:r>
+              <a:rPr lang="en-US" dirty="0" err="1"/>
+              <a:t>RQ</a:t>
+            </a:r>
+            <a:r>
+              <a:rPr lang="en-US" dirty="0"/>
+              <a:t>, in which we do some descriptive analyses regarding a variable. </a:t>
+            </a:r>
+          </a:p>
+          <a:p>
+            <a:r>
+              <a:rPr lang="en-US" dirty="0"/>
+              <a:t>It can be categorical or continuous </a:t>
+            </a:r>
+          </a:p>
+          <a:p>
+            <a:r>
+              <a:rPr lang="en-US" dirty="0"/>
+              <a:t>Then, we also covered difference </a:t>
+            </a:r>
+            <a:r>
+              <a:rPr lang="en-US" dirty="0" err="1"/>
+              <a:t>RQ</a:t>
+            </a:r>
+            <a:r>
+              <a:rPr lang="en-US" dirty="0"/>
+              <a:t>, in which the difference variable has to be categorical and analysis variable is continuous </a:t>
+            </a:r>
+          </a:p>
+          <a:p>
+            <a:r>
+              <a:rPr lang="en-US" dirty="0"/>
+              <a:t>Association </a:t>
+            </a:r>
+            <a:r>
+              <a:rPr lang="en-US" dirty="0" err="1"/>
+              <a:t>RQ</a:t>
+            </a:r>
+            <a:r>
+              <a:rPr lang="en-US" dirty="0"/>
+              <a:t> is between 2 continuous variables. </a:t>
+            </a:r>
+          </a:p>
+          <a:p>
+            <a:endParaRPr lang="en-US" dirty="0"/>
           </a:p>
         </p:txBody>
       </p:sp>
@@ -16560,7 +16662,7 @@
           <a:p>
             <a:fld id="{BC849E9A-41F7-4779-A581-48A7C374A227}" type="slidenum">
               <a:rPr lang="en-US" smtClean="0"/>
-              <a:t>7</a:t>
+              <a:t>6</a:t>
             </a:fld>
             <a:endParaRPr lang="en-US" dirty="0"/>
           </a:p>
@@ -16569,7 +16671,7 @@
     </p:spTree>
     <p:extLst>
       <p:ext uri="{BB962C8B-B14F-4D97-AF65-F5344CB8AC3E}">
-        <p14:creationId xmlns:p14="http://schemas.microsoft.com/office/powerpoint/2010/main" val="2660011446"/>
+        <p14:creationId xmlns:p14="http://schemas.microsoft.com/office/powerpoint/2010/main" val="255056152"/>
       </p:ext>
     </p:extLst>
   </p:cSld>
@@ -16625,11 +16727,8 @@
           <a:p>
             <a:r>
               <a:rPr lang="en-US" dirty="0"/>
-              <a:t>What do you think  What type of association is this?</a:t>
+              <a:t>We will go into detail for the last question </a:t>
             </a:r>
-          </a:p>
-          <a:p>
-            <a:endParaRPr lang="en-US" dirty="0"/>
           </a:p>
         </p:txBody>
       </p:sp>
@@ -16650,7 +16749,7 @@
           <a:p>
             <a:fld id="{BC849E9A-41F7-4779-A581-48A7C374A227}" type="slidenum">
               <a:rPr lang="en-US" smtClean="0"/>
-              <a:t>8</a:t>
+              <a:t>7</a:t>
             </a:fld>
             <a:endParaRPr lang="en-US" dirty="0"/>
           </a:p>
@@ -16659,7 +16758,7 @@
     </p:spTree>
     <p:extLst>
       <p:ext uri="{BB962C8B-B14F-4D97-AF65-F5344CB8AC3E}">
-        <p14:creationId xmlns:p14="http://schemas.microsoft.com/office/powerpoint/2010/main" val="4143770988"/>
+        <p14:creationId xmlns:p14="http://schemas.microsoft.com/office/powerpoint/2010/main" val="2660011446"/>
       </p:ext>
     </p:extLst>
   </p:cSld>
@@ -16715,7 +16814,7 @@
           <a:p>
             <a:r>
               <a:rPr lang="en-US" dirty="0"/>
-              <a:t>Negative association </a:t>
+              <a:t>What do you think  What type of association is this?</a:t>
             </a:r>
           </a:p>
           <a:p>
@@ -16740,7 +16839,7 @@
           <a:p>
             <a:fld id="{BC849E9A-41F7-4779-A581-48A7C374A227}" type="slidenum">
               <a:rPr lang="en-US" smtClean="0"/>
-              <a:t>9</a:t>
+              <a:t>8</a:t>
             </a:fld>
             <a:endParaRPr lang="en-US" dirty="0"/>
           </a:p>
@@ -16749,7 +16848,7 @@
     </p:spTree>
     <p:extLst>
       <p:ext uri="{BB962C8B-B14F-4D97-AF65-F5344CB8AC3E}">
-        <p14:creationId xmlns:p14="http://schemas.microsoft.com/office/powerpoint/2010/main" val="1696638024"/>
+        <p14:creationId xmlns:p14="http://schemas.microsoft.com/office/powerpoint/2010/main" val="4143770988"/>
       </p:ext>
     </p:extLst>
   </p:cSld>
@@ -16805,8 +16904,11 @@
           <a:p>
             <a:r>
               <a:rPr lang="en-US" dirty="0"/>
-              <a:t>What type of association is this?</a:t>
+              <a:t>Negative association </a:t>
             </a:r>
+          </a:p>
+          <a:p>
+            <a:endParaRPr lang="en-US" dirty="0"/>
           </a:p>
         </p:txBody>
       </p:sp>
@@ -16827,7 +16929,7 @@
           <a:p>
             <a:fld id="{BC849E9A-41F7-4779-A581-48A7C374A227}" type="slidenum">
               <a:rPr lang="en-US" smtClean="0"/>
-              <a:t>10</a:t>
+              <a:t>9</a:t>
             </a:fld>
             <a:endParaRPr lang="en-US" dirty="0"/>
           </a:p>
@@ -16836,7 +16938,7 @@
     </p:spTree>
     <p:extLst>
       <p:ext uri="{BB962C8B-B14F-4D97-AF65-F5344CB8AC3E}">
-        <p14:creationId xmlns:p14="http://schemas.microsoft.com/office/powerpoint/2010/main" val="2956827631"/>
+        <p14:creationId xmlns:p14="http://schemas.microsoft.com/office/powerpoint/2010/main" val="1696638024"/>
       </p:ext>
     </p:extLst>
   </p:cSld>
@@ -16892,7 +16994,7 @@
           <a:p>
             <a:r>
               <a:rPr lang="en-US" dirty="0"/>
-              <a:t>Which plot do you think has a stronger association? (Left one) </a:t>
+              <a:t>What type of association is this?</a:t>
             </a:r>
           </a:p>
         </p:txBody>
@@ -16914,7 +17016,7 @@
           <a:p>
             <a:fld id="{BC849E9A-41F7-4779-A581-48A7C374A227}" type="slidenum">
               <a:rPr lang="en-US" smtClean="0"/>
-              <a:t>12</a:t>
+              <a:t>10</a:t>
             </a:fld>
             <a:endParaRPr lang="en-US" dirty="0"/>
           </a:p>
@@ -16923,7 +17025,7 @@
     </p:spTree>
     <p:extLst>
       <p:ext uri="{BB962C8B-B14F-4D97-AF65-F5344CB8AC3E}">
-        <p14:creationId xmlns:p14="http://schemas.microsoft.com/office/powerpoint/2010/main" val="3277015616"/>
+        <p14:creationId xmlns:p14="http://schemas.microsoft.com/office/powerpoint/2010/main" val="2956827631"/>
       </p:ext>
     </p:extLst>
   </p:cSld>
@@ -17080,7 +17182,7 @@
           <a:p>
             <a:fld id="{DECF21A4-E71B-4D3A-AF45-E989C23A7BB1}" type="datetimeFigureOut">
               <a:rPr lang="en-US" smtClean="0"/>
-              <a:t>11/1/2021</a:t>
+              <a:t>4/3/2022</a:t>
             </a:fld>
             <a:endParaRPr lang="en-US" dirty="0"/>
           </a:p>
@@ -17278,7 +17380,7 @@
           <a:p>
             <a:fld id="{DECF21A4-E71B-4D3A-AF45-E989C23A7BB1}" type="datetimeFigureOut">
               <a:rPr lang="en-US" smtClean="0"/>
-              <a:t>11/1/2021</a:t>
+              <a:t>4/3/2022</a:t>
             </a:fld>
             <a:endParaRPr lang="en-US" dirty="0"/>
           </a:p>
@@ -17486,7 +17588,7 @@
           <a:p>
             <a:fld id="{DECF21A4-E71B-4D3A-AF45-E989C23A7BB1}" type="datetimeFigureOut">
               <a:rPr lang="en-US" smtClean="0"/>
-              <a:t>11/1/2021</a:t>
+              <a:t>4/3/2022</a:t>
             </a:fld>
             <a:endParaRPr lang="en-US" dirty="0"/>
           </a:p>
@@ -17684,7 +17786,7 @@
           <a:p>
             <a:fld id="{DECF21A4-E71B-4D3A-AF45-E989C23A7BB1}" type="datetimeFigureOut">
               <a:rPr lang="en-US" smtClean="0"/>
-              <a:t>11/1/2021</a:t>
+              <a:t>4/3/2022</a:t>
             </a:fld>
             <a:endParaRPr lang="en-US" dirty="0"/>
           </a:p>
@@ -17959,7 +18061,7 @@
           <a:p>
             <a:fld id="{DECF21A4-E71B-4D3A-AF45-E989C23A7BB1}" type="datetimeFigureOut">
               <a:rPr lang="en-US" smtClean="0"/>
-              <a:t>11/1/2021</a:t>
+              <a:t>4/3/2022</a:t>
             </a:fld>
             <a:endParaRPr lang="en-US" dirty="0"/>
           </a:p>
@@ -18224,7 +18326,7 @@
           <a:p>
             <a:fld id="{DECF21A4-E71B-4D3A-AF45-E989C23A7BB1}" type="datetimeFigureOut">
               <a:rPr lang="en-US" smtClean="0"/>
-              <a:t>11/1/2021</a:t>
+              <a:t>4/3/2022</a:t>
             </a:fld>
             <a:endParaRPr lang="en-US" dirty="0"/>
           </a:p>
@@ -18636,7 +18738,7 @@
           <a:p>
             <a:fld id="{DECF21A4-E71B-4D3A-AF45-E989C23A7BB1}" type="datetimeFigureOut">
               <a:rPr lang="en-US" smtClean="0"/>
-              <a:t>11/1/2021</a:t>
+              <a:t>4/3/2022</a:t>
             </a:fld>
             <a:endParaRPr lang="en-US" dirty="0"/>
           </a:p>
@@ -18777,7 +18879,7 @@
           <a:p>
             <a:fld id="{DECF21A4-E71B-4D3A-AF45-E989C23A7BB1}" type="datetimeFigureOut">
               <a:rPr lang="en-US" smtClean="0"/>
-              <a:t>11/1/2021</a:t>
+              <a:t>4/3/2022</a:t>
             </a:fld>
             <a:endParaRPr lang="en-US" dirty="0"/>
           </a:p>
@@ -18890,7 +18992,7 @@
           <a:p>
             <a:fld id="{DECF21A4-E71B-4D3A-AF45-E989C23A7BB1}" type="datetimeFigureOut">
               <a:rPr lang="en-US" smtClean="0"/>
-              <a:t>11/1/2021</a:t>
+              <a:t>4/3/2022</a:t>
             </a:fld>
             <a:endParaRPr lang="en-US" dirty="0"/>
           </a:p>
@@ -19201,7 +19303,7 @@
           <a:p>
             <a:fld id="{DECF21A4-E71B-4D3A-AF45-E989C23A7BB1}" type="datetimeFigureOut">
               <a:rPr lang="en-US" smtClean="0"/>
-              <a:t>11/1/2021</a:t>
+              <a:t>4/3/2022</a:t>
             </a:fld>
             <a:endParaRPr lang="en-US" dirty="0"/>
           </a:p>
@@ -19493,7 +19595,7 @@
           <a:p>
             <a:fld id="{DECF21A4-E71B-4D3A-AF45-E989C23A7BB1}" type="datetimeFigureOut">
               <a:rPr lang="en-US" smtClean="0"/>
-              <a:t>11/1/2021</a:t>
+              <a:t>4/3/2022</a:t>
             </a:fld>
             <a:endParaRPr lang="en-US" dirty="0"/>
           </a:p>
@@ -19734,7 +19836,7 @@
           <a:p>
             <a:fld id="{DECF21A4-E71B-4D3A-AF45-E989C23A7BB1}" type="datetimeFigureOut">
               <a:rPr lang="en-US" smtClean="0"/>
-              <a:t>11/1/2021</a:t>
+              <a:t>4/3/2022</a:t>
             </a:fld>
             <a:endParaRPr lang="en-US" dirty="0"/>
           </a:p>
@@ -20358,19 +20460,6 @@
                   <a:schemeClr val="bg1"/>
                 </a:solidFill>
               </a:rPr>
-              <a:t>Get some candies</a:t>
-            </a:r>
-          </a:p>
-          <a:p>
-            <a:pPr marL="0" indent="0">
-              <a:buNone/>
-            </a:pPr>
-            <a:r>
-              <a:rPr lang="en-US" sz="2000" dirty="0">
-                <a:solidFill>
-                  <a:schemeClr val="bg1"/>
-                </a:solidFill>
-              </a:rPr>
               <a:t>Take your name tag </a:t>
             </a:r>
           </a:p>
@@ -20404,7 +20493,7 @@
           <p:nvPr/>
         </p:nvPicPr>
         <p:blipFill>
-          <a:blip r:embed="rId2">
+          <a:blip r:embed="rId3">
             <a:extLst>
               <a:ext uri="{28A0092B-C50C-407E-A947-70E740481C1C}">
                 <a14:useLocalDpi xmlns:a14="http://schemas.microsoft.com/office/drawing/2010/main" val="0"/>
@@ -41877,6 +41966,15 @@
 </file>
 
 <file path=customXml/item1.xml><?xml version="1.0" encoding="utf-8"?>
+<?mso-contentType ?>
+<FormTemplates xmlns="http://schemas.microsoft.com/sharepoint/v3/contenttype/forms">
+  <Display>DocumentLibraryForm</Display>
+  <Edit>DocumentLibraryForm</Edit>
+  <New>DocumentLibraryForm</New>
+</FormTemplates>
+</file>
+
+<file path=customXml/item2.xml><?xml version="1.0" encoding="utf-8"?>
 <ct:contentTypeSchema xmlns:ct="http://schemas.microsoft.com/office/2006/metadata/contentType" xmlns:ma="http://schemas.microsoft.com/office/2006/metadata/properties/metaAttributes" ct:_="" ma:_="" ma:contentTypeName="Document" ma:contentTypeID="0x01010079F111ED35F8CC479449609E8A0923A6" ma:contentTypeVersion="11" ma:contentTypeDescription="Create a new document." ma:contentTypeScope="" ma:versionID="96291512c1ee715ab617f4c07df79fc1">
   <xsd:schema xmlns:xsd="http://www.w3.org/2001/XMLSchema" xmlns:xs="http://www.w3.org/2001/XMLSchema" xmlns:p="http://schemas.microsoft.com/office/2006/metadata/properties" xmlns:ns2="71af3243-3dd4-4a8d-8c0d-dd76da1f02a5" xmlns:ns3="16c05727-aa75-4e4a-9b5f-8a80a1165891" targetNamespace="http://schemas.microsoft.com/office/2006/metadata/properties" ma:root="true" ma:fieldsID="8256c27c40ca5c40ce1cf6c44f0205df" ns2:_="" ns3:_="">
     <xsd:import namespace="71af3243-3dd4-4a8d-8c0d-dd76da1f02a5"/>
@@ -42087,15 +42185,6 @@
 </ct:contentTypeSchema>
 </file>
 
-<file path=customXml/item2.xml><?xml version="1.0" encoding="utf-8"?>
-<?mso-contentType ?>
-<FormTemplates xmlns="http://schemas.microsoft.com/sharepoint/v3/contenttype/forms">
-  <Display>DocumentLibraryForm</Display>
-  <Edit>DocumentLibraryForm</Edit>
-  <New>DocumentLibraryForm</New>
-</FormTemplates>
-</file>
-
 <file path=customXml/item3.xml><?xml version="1.0" encoding="utf-8"?>
 <p:properties xmlns:p="http://schemas.microsoft.com/office/2006/metadata/properties" xmlns:xsi="http://www.w3.org/2001/XMLSchema-instance" xmlns:pc="http://schemas.microsoft.com/office/infopath/2007/PartnerControls">
   <documentManagement>
@@ -42105,6 +42194,14 @@
 </file>
 
 <file path=customXml/itemProps1.xml><?xml version="1.0" encoding="utf-8"?>
+<ds:datastoreItem xmlns:ds="http://schemas.openxmlformats.org/officeDocument/2006/customXml" ds:itemID="{5CA875DA-F9FD-4F83-A049-3B1027B542DE}">
+  <ds:schemaRefs>
+    <ds:schemaRef ds:uri="http://schemas.microsoft.com/sharepoint/v3/contenttype/forms"/>
+  </ds:schemaRefs>
+</ds:datastoreItem>
+</file>
+
+<file path=customXml/itemProps2.xml><?xml version="1.0" encoding="utf-8"?>
 <ds:datastoreItem xmlns:ds="http://schemas.openxmlformats.org/officeDocument/2006/customXml" ds:itemID="{B2AB02E3-5ADF-4BF0-9C1B-35CDF3FE95B0}">
   <ds:schemaRefs>
     <ds:schemaRef ds:uri="http://schemas.microsoft.com/office/2006/metadata/contentType"/>
@@ -42123,14 +42220,6 @@
 </ds:datastoreItem>
 </file>
 
-<file path=customXml/itemProps2.xml><?xml version="1.0" encoding="utf-8"?>
-<ds:datastoreItem xmlns:ds="http://schemas.openxmlformats.org/officeDocument/2006/customXml" ds:itemID="{5CA875DA-F9FD-4F83-A049-3B1027B542DE}">
-  <ds:schemaRefs>
-    <ds:schemaRef ds:uri="http://schemas.microsoft.com/sharepoint/v3/contenttype/forms"/>
-  </ds:schemaRefs>
-</ds:datastoreItem>
-</file>
-
 <file path=customXml/itemProps3.xml><?xml version="1.0" encoding="utf-8"?>
 <ds:datastoreItem xmlns:ds="http://schemas.openxmlformats.org/officeDocument/2006/customXml" ds:itemID="{03C7D9E6-B0D9-433E-BD46-EB60F64F4DA8}">
   <ds:schemaRefs>

</xml_diff>